<commit_message>
update 06 discussion slides
</commit_message>
<xml_diff>
--- a/events/2023-03-15/slides/06-discussion.pptx
+++ b/events/2023-03-15/slides/06-discussion.pptx
@@ -52369,7 +52369,7 @@
                   </a:schemeClr>
                 </a:solidFill>
               </a:rPr>
-              <a:t>工学系研究科 准教授 吉田塁</a:t>
+              <a:t>工学系研究科　吉田塁</a:t>
             </a:r>
             <a:endParaRPr lang="en-US" altLang="ja-JP" dirty="0">
               <a:solidFill>
@@ -52391,7 +52391,7 @@
                   </a:schemeClr>
                 </a:solidFill>
               </a:rPr>
-              <a:t>文学部 </a:t>
+              <a:t>文学部</a:t>
             </a:r>
             <a:r>
               <a:rPr lang="en-US" altLang="ja-JP" dirty="0">
@@ -52413,7 +52413,7 @@
                   </a:schemeClr>
                 </a:solidFill>
               </a:rPr>
-              <a:t>年生 </a:t>
+              <a:t>年生　</a:t>
             </a:r>
             <a:r>
               <a:rPr kumimoji="1" lang="ja-JP" altLang="en-US" dirty="0">
@@ -52726,9 +52726,9 @@
           <a:p>
             <a:r>
               <a:rPr kumimoji="1" lang="en-US" altLang="ja-JP" dirty="0"/>
-              <a:t>2022/9/14</a:t>
+              <a:t>2023/3/15</a:t>
             </a:r>
-            <a:endParaRPr kumimoji="1" lang="ja-JP" altLang="en-US"/>
+            <a:endParaRPr kumimoji="1" lang="ja-JP" altLang="en-US" dirty="0"/>
           </a:p>
         </p:txBody>
       </p:sp>
@@ -52856,7 +52856,7 @@
         </p:nvSpPr>
         <p:spPr>
           <a:xfrm>
-            <a:off x="457200" y="1500174"/>
+            <a:off x="457200" y="1464078"/>
             <a:ext cx="8507288" cy="4525963"/>
           </a:xfrm>
         </p:spPr>
@@ -53971,6 +53971,16 @@
               <a:t>GPT-4 </a:t>
             </a:r>
             <a:r>
+              <a:rPr lang="ja-JP" altLang="en-US" sz="2400" b="1" kern="1200" dirty="0">
+                <a:solidFill>
+                  <a:prstClr val="black"/>
+                </a:solidFill>
+                <a:latin typeface="游ゴシック" panose="020F0502020204030204"/>
+                <a:ea typeface="游ゴシック" panose="020B0400000000000000" pitchFamily="50" charset="-128"/>
+              </a:rPr>
+              <a:t>が有料プランで</a:t>
+            </a:r>
+            <a:r>
               <a:rPr kumimoji="1" lang="ja-JP" altLang="en-US" sz="2400" b="1" i="0" u="none" strike="noStrike" kern="1200" cap="none" spc="0" normalizeH="0" baseline="0" noProof="0" dirty="0">
                 <a:ln>
                   <a:noFill/>
@@ -53985,7 +53995,7 @@
                 <a:ea typeface="游ゴシック" panose="020B0400000000000000" pitchFamily="50" charset="-128"/>
                 <a:cs typeface="+mn-cs"/>
               </a:rPr>
-              <a:t>が利用可能</a:t>
+              <a:t>利用可能</a:t>
             </a:r>
             <a:r>
               <a:rPr kumimoji="1" lang="en-US" altLang="ja-JP" sz="2400" b="1" i="0" u="none" strike="noStrike" kern="1200" cap="none" spc="0" normalizeH="0" baseline="30000" noProof="0" dirty="0">
@@ -54065,7 +54075,7 @@
         </p:nvSpPr>
         <p:spPr>
           <a:xfrm>
-            <a:off x="136029" y="4869160"/>
+            <a:off x="136029" y="5010107"/>
             <a:ext cx="9116491" cy="2031325"/>
           </a:xfrm>
           <a:prstGeom prst="rect">
@@ -54333,7 +54343,7 @@
         </p:spPr>
         <p:txBody>
           <a:bodyPr>
-            <a:normAutofit lnSpcReduction="10000"/>
+            <a:normAutofit fontScale="92500" lnSpcReduction="20000"/>
           </a:bodyPr>
           <a:lstStyle/>
           <a:p>
@@ -54402,15 +54412,21 @@
               <a:t>*</a:t>
             </a:r>
             <a:r>
-              <a:rPr lang="en-US" altLang="ja-JP" sz="2400" b="1" kern="1200" baseline="30000" dirty="0">
+              <a:rPr kumimoji="1" lang="en-US" altLang="ja-JP" sz="2400" b="1" i="0" u="none" strike="noStrike" kern="1200" cap="none" spc="0" normalizeH="0" baseline="30000" noProof="0" dirty="0">
+                <a:ln>
+                  <a:noFill/>
+                </a:ln>
                 <a:solidFill>
                   <a:prstClr val="black"/>
                 </a:solidFill>
+                <a:effectLst/>
+                <a:uLnTx/>
+                <a:uFillTx/>
                 <a:latin typeface="游ゴシック" panose="020F0502020204030204"/>
                 <a:ea typeface="游ゴシック" panose="020B0400000000000000" pitchFamily="50" charset="-128"/>
                 <a:hlinkClick r:id="rId2"/>
               </a:rPr>
-              <a:t>1</a:t>
+              <a:t>8</a:t>
             </a:r>
             <a:r>
               <a:rPr kumimoji="1" lang="en-US" altLang="ja-JP" sz="2400" b="1" i="0" u="none" strike="noStrike" kern="1200" cap="none" spc="0" normalizeH="0" baseline="30000" noProof="0" dirty="0">
@@ -54659,7 +54675,7 @@
                 <a:cs typeface="+mn-cs"/>
                 <a:hlinkClick r:id="rId5"/>
               </a:rPr>
-              <a:t>2</a:t>
+              <a:t>9</a:t>
             </a:r>
             <a:r>
               <a:rPr kumimoji="1" lang="en-US" altLang="ja-JP" sz="2400" b="1" i="0" u="none" strike="noStrike" kern="1200" cap="none" spc="0" normalizeH="0" baseline="30000" noProof="0" dirty="0">
@@ -54694,7 +54710,7 @@
                 <a:cs typeface="+mn-cs"/>
                 <a:hlinkClick r:id="rId6"/>
               </a:rPr>
-              <a:t>*3</a:t>
+              <a:t>*10</a:t>
             </a:r>
             <a:r>
               <a:rPr kumimoji="1" lang="en-US" altLang="ja-JP" sz="2400" b="1" i="0" u="none" strike="noStrike" kern="1200" cap="none" spc="0" normalizeH="0" baseline="30000" noProof="0" dirty="0">
@@ -54729,9 +54745,55 @@
                 <a:cs typeface="+mn-cs"/>
                 <a:hlinkClick r:id="rId7"/>
               </a:rPr>
-              <a:t>*4</a:t>
+              <a:t>*11</a:t>
             </a:r>
             <a:endParaRPr kumimoji="1" lang="en-US" altLang="ja-JP" sz="2400" b="1" i="0" u="none" strike="noStrike" kern="1200" cap="none" spc="0" normalizeH="0" baseline="30000" noProof="0" dirty="0">
+              <a:ln>
+                <a:noFill/>
+              </a:ln>
+              <a:solidFill>
+                <a:prstClr val="black"/>
+              </a:solidFill>
+              <a:effectLst/>
+              <a:uLnTx/>
+              <a:uFillTx/>
+              <a:latin typeface="游ゴシック" panose="020F0502020204030204"/>
+              <a:ea typeface="游ゴシック" panose="020B0400000000000000" pitchFamily="50" charset="-128"/>
+              <a:cs typeface="+mn-cs"/>
+            </a:endParaRPr>
+          </a:p>
+          <a:p>
+            <a:pPr marL="628650" lvl="1" indent="-228600">
+              <a:lnSpc>
+                <a:spcPct val="90000"/>
+              </a:lnSpc>
+              <a:spcBef>
+                <a:spcPts val="1000"/>
+              </a:spcBef>
+              <a:buClrTx/>
+              <a:buSzTx/>
+              <a:buFont typeface="Arial" panose="020B0604020202020204" pitchFamily="34" charset="0"/>
+              <a:buChar char="•"/>
+              <a:defRPr/>
+            </a:pPr>
+            <a:r>
+              <a:rPr kumimoji="1" lang="ja-JP" altLang="en-US" sz="2000" b="1" i="0" u="none" strike="noStrike" kern="1200" cap="none" spc="0" normalizeH="0" baseline="0" noProof="0" dirty="0">
+                <a:ln>
+                  <a:noFill/>
+                </a:ln>
+                <a:solidFill>
+                  <a:prstClr val="black"/>
+                </a:solidFill>
+                <a:effectLst/>
+                <a:uLnTx/>
+                <a:uFillTx/>
+                <a:latin typeface="游ゴシック" panose="020F0502020204030204"/>
+                <a:ea typeface="游ゴシック" panose="020B0400000000000000" pitchFamily="50" charset="-128"/>
+                <a:cs typeface="+mn-cs"/>
+              </a:rPr>
+              <a:t>思うような出力が得られなくても対話を通して修正を促せる</a:t>
+            </a:r>
+            <a:endParaRPr kumimoji="1" lang="en-US" altLang="ja-JP" sz="2000" b="1" i="0" u="none" strike="noStrike" kern="1200" cap="none" spc="0" normalizeH="0" baseline="0" noProof="0" dirty="0">
               <a:ln>
                 <a:noFill/>
               </a:ln>
@@ -54827,7 +54889,7 @@
                 <a:cs typeface="+mn-cs"/>
                 <a:hlinkClick r:id="rId8"/>
               </a:rPr>
-              <a:t>*5</a:t>
+              <a:t>*12</a:t>
             </a:r>
             <a:r>
               <a:rPr kumimoji="1" lang="en-US" altLang="ja-JP" sz="2400" b="1" i="0" u="none" strike="noStrike" kern="1200" cap="none" spc="0" normalizeH="0" baseline="30000" noProof="0" dirty="0">
@@ -54862,7 +54924,7 @@
                 <a:cs typeface="+mn-cs"/>
                 <a:hlinkClick r:id="rId9"/>
               </a:rPr>
-              <a:t>*6</a:t>
+              <a:t>*13</a:t>
             </a:r>
             <a:endParaRPr kumimoji="1" lang="en-US" altLang="ja-JP" sz="2400" b="1" i="0" u="none" strike="noStrike" kern="1200" cap="none" spc="0" normalizeH="0" baseline="30000" noProof="0" dirty="0">
               <a:ln>
@@ -55278,7 +55340,7 @@
                 <a:ea typeface="游ゴシック" panose="020B0400000000000000" pitchFamily="50" charset="-128"/>
                 <a:cs typeface="+mn-cs"/>
               </a:rPr>
-              <a:t>から</a:t>
+              <a:t>は</a:t>
             </a:r>
             <a:r>
               <a:rPr kumimoji="1" lang="ja-JP" altLang="en-US" sz="2000" b="1" i="0" u="none" strike="noStrike" kern="1200" cap="none" spc="0" normalizeH="0" baseline="0" noProof="0" dirty="0">
@@ -55317,6 +55379,17 @@
               <a:t>URL </a:t>
             </a:r>
             <a:r>
+              <a:rPr lang="ja-JP" altLang="en-US" sz="2000" b="1" kern="1200" dirty="0">
+                <a:solidFill>
+                  <a:prstClr val="black"/>
+                </a:solidFill>
+                <a:latin typeface="游ゴシック" panose="020F0502020204030204"/>
+                <a:ea typeface="游ゴシック" panose="020B0400000000000000" pitchFamily="50" charset="-128"/>
+                <a:hlinkClick r:id="rId11"/>
+              </a:rPr>
+              <a:t>を</a:t>
+            </a:r>
+            <a:r>
               <a:rPr kumimoji="1" lang="ja-JP" altLang="en-US" sz="2000" b="1" i="0" u="none" strike="noStrike" kern="1200" cap="none" spc="0" normalizeH="0" baseline="0" noProof="0" dirty="0">
                 <a:ln>
                   <a:noFill/>
@@ -55332,7 +55405,7 @@
                 <a:cs typeface="+mn-cs"/>
                 <a:hlinkClick r:id="rId11"/>
               </a:rPr>
-              <a:t>が付与</a:t>
+              <a:t>付与</a:t>
             </a:r>
             <a:r>
               <a:rPr kumimoji="1" lang="ja-JP" altLang="en-US" sz="2000" b="1" i="0" u="none" strike="noStrike" kern="1200" cap="none" spc="0" normalizeH="0" baseline="0" noProof="0" dirty="0">
@@ -55349,7 +55422,7 @@
                 <a:ea typeface="游ゴシック" panose="020B0400000000000000" pitchFamily="50" charset="-128"/>
                 <a:cs typeface="+mn-cs"/>
               </a:rPr>
-              <a:t>されるようになった</a:t>
+              <a:t>する場合あり（必ずではない）</a:t>
             </a:r>
             <a:endParaRPr kumimoji="1" lang="en-US" altLang="ja-JP" sz="2000" b="1" i="0" u="none" strike="noStrike" kern="1200" cap="none" spc="0" normalizeH="0" baseline="0" noProof="0" dirty="0">
               <a:ln>
@@ -55986,7 +56059,7 @@
                 <a:ea typeface="游ゴシック" panose="020B0400000000000000" pitchFamily="50" charset="-128"/>
                 <a:cs typeface="+mn-cs"/>
               </a:rPr>
-              <a:t>が作ったレポートを渡して修正させる・良いところや改善点を挙げさせる、学生に</a:t>
+              <a:t>が作ったレポートを渡して修正させる・良い点や改善点を挙げさせる、学生に</a:t>
             </a:r>
             <a:r>
               <a:rPr kumimoji="1" lang="en-US" altLang="ja-JP" sz="2000" b="1" i="0" u="none" strike="noStrike" kern="1200" cap="none" spc="0" normalizeH="0" baseline="0" noProof="0" dirty="0">
@@ -56198,6 +56271,23 @@
               <a:t>教員が </a:t>
             </a:r>
             <a:r>
+              <a:rPr kumimoji="1" lang="en-US" altLang="ja-JP" sz="2400" b="1" i="0" u="none" strike="noStrike" kern="1200" cap="none" spc="0" normalizeH="0" baseline="0" noProof="0" dirty="0" err="1">
+                <a:ln>
+                  <a:noFill/>
+                </a:ln>
+                <a:solidFill>
+                  <a:prstClr val="black"/>
+                </a:solidFill>
+                <a:effectLst/>
+                <a:uLnTx/>
+                <a:uFillTx/>
+                <a:latin typeface="游ゴシック" panose="020F0502020204030204"/>
+                <a:ea typeface="游ゴシック" panose="020B0400000000000000" pitchFamily="50" charset="-128"/>
+                <a:cs typeface="+mn-cs"/>
+              </a:rPr>
+              <a:t>ChatGPT</a:t>
+            </a:r>
+            <a:r>
               <a:rPr kumimoji="1" lang="en-US" altLang="ja-JP" sz="2400" b="1" i="0" u="none" strike="noStrike" kern="1200" cap="none" spc="0" normalizeH="0" baseline="0" noProof="0" dirty="0">
                 <a:ln>
                   <a:noFill/>
@@ -56212,7 +56302,7 @@
                 <a:ea typeface="游ゴシック" panose="020B0400000000000000" pitchFamily="50" charset="-128"/>
                 <a:cs typeface="+mn-cs"/>
               </a:rPr>
-              <a:t>Chat GPT </a:t>
+              <a:t> </a:t>
             </a:r>
             <a:r>
               <a:rPr kumimoji="1" lang="ja-JP" altLang="en-US" sz="2400" b="1" i="0" u="none" strike="noStrike" kern="1200" cap="none" spc="0" normalizeH="0" baseline="0" noProof="0" dirty="0">
@@ -59016,7 +59106,7 @@
                   </a:schemeClr>
                 </a:solidFill>
               </a:rPr>
-              <a:t>今日の意見交換が、</a:t>
+              <a:t>今日の意見交換が </a:t>
             </a:r>
             <a:r>
               <a:rPr lang="en-US" altLang="ja-JP" sz="2800" dirty="0" err="1">

</xml_diff>